<commit_message>
Tarea de hojas de estilo
La actividad esta en las ultimas 2 diapositivas
</commit_message>
<xml_diff>
--- a/html5.pptx
+++ b/html5.pptx
@@ -59,6 +59,8 @@
     <p:sldId id="293" r:id="rId53"/>
     <p:sldId id="294" r:id="rId54"/>
     <p:sldId id="295" r:id="rId55"/>
+    <p:sldId id="311" r:id="rId56"/>
+    <p:sldId id="312" r:id="rId57"/>
   </p:sldIdLst>
   <p:sldSz cx="12192000" cy="6858000"/>
   <p:notesSz cx="6858000" cy="9144000"/>
@@ -260,7 +262,7 @@
           <a:effectLst/>
           <a:extLst>
             <a:ext uri="{91240B29-F687-4f45-9708-019B960494DF}">
-              <a14:hiddenLine xmlns:a14="http://schemas.microsoft.com/office/drawing/2010/main" xmlns="" w="9525">
+              <a14:hiddenLine xmlns="" xmlns:a14="http://schemas.microsoft.com/office/drawing/2010/main" w="9525">
                 <a:solidFill>
                   <a:srgbClr val="000000"/>
                 </a:solidFill>
@@ -452,7 +454,7 @@
           <a:p>
             <a:fld id="{62679F1D-5062-4A60-BCF1-CCD0E44F4E32}" type="datetimeFigureOut">
               <a:rPr lang="es-MX" smtClean="0"/>
-              <a:t>09/05/2018</a:t>
+              <a:t>16/05/2018</a:t>
             </a:fld>
             <a:endParaRPr lang="es-MX"/>
           </a:p>
@@ -770,7 +772,7 @@
           <a:p>
             <a:fld id="{62679F1D-5062-4A60-BCF1-CCD0E44F4E32}" type="datetimeFigureOut">
               <a:rPr lang="es-MX" smtClean="0"/>
-              <a:t>09/05/2018</a:t>
+              <a:t>16/05/2018</a:t>
             </a:fld>
             <a:endParaRPr lang="es-MX"/>
           </a:p>
@@ -1258,7 +1260,7 @@
           <a:p>
             <a:fld id="{62679F1D-5062-4A60-BCF1-CCD0E44F4E32}" type="datetimeFigureOut">
               <a:rPr lang="es-MX" smtClean="0"/>
-              <a:t>09/05/2018</a:t>
+              <a:t>16/05/2018</a:t>
             </a:fld>
             <a:endParaRPr lang="es-MX"/>
           </a:p>
@@ -1627,7 +1629,7 @@
           <a:p>
             <a:fld id="{62679F1D-5062-4A60-BCF1-CCD0E44F4E32}" type="datetimeFigureOut">
               <a:rPr lang="es-MX" smtClean="0"/>
-              <a:t>09/05/2018</a:t>
+              <a:t>16/05/2018</a:t>
             </a:fld>
             <a:endParaRPr lang="es-MX"/>
           </a:p>
@@ -1782,7 +1784,7 @@
           <a:ln/>
           <a:extLst>
             <a:ext uri="{91240B29-F687-4f45-9708-019B960494DF}">
-              <a14:hiddenLine xmlns:a14="http://schemas.microsoft.com/office/drawing/2010/main" xmlns="" w="9525">
+              <a14:hiddenLine xmlns="" xmlns:a14="http://schemas.microsoft.com/office/drawing/2010/main" w="9525">
                 <a:solidFill>
                   <a:srgbClr val="000000"/>
                 </a:solidFill>
@@ -1900,7 +1902,7 @@
           <a:p>
             <a:fld id="{62679F1D-5062-4A60-BCF1-CCD0E44F4E32}" type="datetimeFigureOut">
               <a:rPr lang="es-MX" smtClean="0"/>
-              <a:t>09/05/2018</a:t>
+              <a:t>16/05/2018</a:t>
             </a:fld>
             <a:endParaRPr lang="es-MX"/>
           </a:p>
@@ -2057,7 +2059,7 @@
           <a:ln/>
           <a:extLst>
             <a:ext uri="{91240B29-F687-4f45-9708-019B960494DF}">
-              <a14:hiddenLine xmlns:a14="http://schemas.microsoft.com/office/drawing/2010/main" xmlns="" w="9525">
+              <a14:hiddenLine xmlns="" xmlns:a14="http://schemas.microsoft.com/office/drawing/2010/main" w="9525">
                 <a:solidFill>
                   <a:srgbClr val="000000"/>
                 </a:solidFill>
@@ -2185,7 +2187,7 @@
           <a:p>
             <a:fld id="{62679F1D-5062-4A60-BCF1-CCD0E44F4E32}" type="datetimeFigureOut">
               <a:rPr lang="es-MX" smtClean="0"/>
-              <a:t>09/05/2018</a:t>
+              <a:t>16/05/2018</a:t>
             </a:fld>
             <a:endParaRPr lang="es-MX"/>
           </a:p>
@@ -2340,7 +2342,7 @@
           <a:ln/>
           <a:extLst>
             <a:ext uri="{91240B29-F687-4f45-9708-019B960494DF}">
-              <a14:hiddenLine xmlns:a14="http://schemas.microsoft.com/office/drawing/2010/main" xmlns="" w="9525">
+              <a14:hiddenLine xmlns="" xmlns:a14="http://schemas.microsoft.com/office/drawing/2010/main" w="9525">
                 <a:solidFill>
                   <a:srgbClr val="000000"/>
                 </a:solidFill>
@@ -2468,7 +2470,7 @@
           <a:p>
             <a:fld id="{62679F1D-5062-4A60-BCF1-CCD0E44F4E32}" type="datetimeFigureOut">
               <a:rPr lang="es-MX" smtClean="0"/>
-              <a:t>09/05/2018</a:t>
+              <a:t>16/05/2018</a:t>
             </a:fld>
             <a:endParaRPr lang="es-MX"/>
           </a:p>
@@ -2811,7 +2813,7 @@
           <a:p>
             <a:fld id="{62679F1D-5062-4A60-BCF1-CCD0E44F4E32}" type="datetimeFigureOut">
               <a:rPr lang="es-MX" smtClean="0"/>
-              <a:t>09/05/2018</a:t>
+              <a:t>16/05/2018</a:t>
             </a:fld>
             <a:endParaRPr lang="es-MX"/>
           </a:p>
@@ -2966,7 +2968,7 @@
           <a:ln/>
           <a:extLst>
             <a:ext uri="{91240B29-F687-4f45-9708-019B960494DF}">
-              <a14:hiddenLine xmlns:a14="http://schemas.microsoft.com/office/drawing/2010/main" xmlns="" w="9525">
+              <a14:hiddenLine xmlns="" xmlns:a14="http://schemas.microsoft.com/office/drawing/2010/main" w="9525">
                 <a:solidFill>
                   <a:srgbClr val="000000"/>
                 </a:solidFill>
@@ -3150,7 +3152,7 @@
           <a:p>
             <a:fld id="{62679F1D-5062-4A60-BCF1-CCD0E44F4E32}" type="datetimeFigureOut">
               <a:rPr lang="es-MX" smtClean="0"/>
-              <a:t>09/05/2018</a:t>
+              <a:t>16/05/2018</a:t>
             </a:fld>
             <a:endParaRPr lang="es-MX"/>
           </a:p>
@@ -3305,7 +3307,7 @@
           <a:ln/>
           <a:extLst>
             <a:ext uri="{91240B29-F687-4f45-9708-019B960494DF}">
-              <a14:hiddenLine xmlns:a14="http://schemas.microsoft.com/office/drawing/2010/main" xmlns="" w="9525">
+              <a14:hiddenLine xmlns="" xmlns:a14="http://schemas.microsoft.com/office/drawing/2010/main" w="9525">
                 <a:solidFill>
                   <a:srgbClr val="000000"/>
                 </a:solidFill>
@@ -3627,7 +3629,7 @@
           <a:p>
             <a:fld id="{62679F1D-5062-4A60-BCF1-CCD0E44F4E32}" type="datetimeFigureOut">
               <a:rPr lang="es-MX" smtClean="0"/>
-              <a:t>09/05/2018</a:t>
+              <a:t>16/05/2018</a:t>
             </a:fld>
             <a:endParaRPr lang="es-MX"/>
           </a:p>
@@ -3782,7 +3784,7 @@
           <a:ln/>
           <a:extLst>
             <a:ext uri="{91240B29-F687-4f45-9708-019B960494DF}">
-              <a14:hiddenLine xmlns:a14="http://schemas.microsoft.com/office/drawing/2010/main" xmlns="" w="9525">
+              <a14:hiddenLine xmlns="" xmlns:a14="http://schemas.microsoft.com/office/drawing/2010/main" w="9525">
                 <a:solidFill>
                   <a:srgbClr val="000000"/>
                 </a:solidFill>
@@ -3848,7 +3850,7 @@
           <a:p>
             <a:fld id="{62679F1D-5062-4A60-BCF1-CCD0E44F4E32}" type="datetimeFigureOut">
               <a:rPr lang="es-MX" smtClean="0"/>
-              <a:t>09/05/2018</a:t>
+              <a:t>16/05/2018</a:t>
             </a:fld>
             <a:endParaRPr lang="es-MX"/>
           </a:p>
@@ -3943,7 +3945,7 @@
           <a:p>
             <a:fld id="{62679F1D-5062-4A60-BCF1-CCD0E44F4E32}" type="datetimeFigureOut">
               <a:rPr lang="es-MX" smtClean="0"/>
-              <a:t>09/05/2018</a:t>
+              <a:t>16/05/2018</a:t>
             </a:fld>
             <a:endParaRPr lang="es-MX"/>
           </a:p>
@@ -4211,7 +4213,7 @@
           <a:ln/>
           <a:extLst>
             <a:ext uri="{91240B29-F687-4f45-9708-019B960494DF}">
-              <a14:hiddenLine xmlns:a14="http://schemas.microsoft.com/office/drawing/2010/main" xmlns="" w="9525">
+              <a14:hiddenLine xmlns="" xmlns:a14="http://schemas.microsoft.com/office/drawing/2010/main" w="9525">
                 <a:solidFill>
                   <a:srgbClr val="000000"/>
                 </a:solidFill>
@@ -4410,7 +4412,7 @@
           <a:p>
             <a:fld id="{62679F1D-5062-4A60-BCF1-CCD0E44F4E32}" type="datetimeFigureOut">
               <a:rPr lang="es-MX" smtClean="0"/>
-              <a:t>09/05/2018</a:t>
+              <a:t>16/05/2018</a:t>
             </a:fld>
             <a:endParaRPr lang="es-MX"/>
           </a:p>
@@ -4723,7 +4725,7 @@
           <a:p>
             <a:fld id="{62679F1D-5062-4A60-BCF1-CCD0E44F4E32}" type="datetimeFigureOut">
               <a:rPr lang="es-MX" smtClean="0"/>
-              <a:t>09/05/2018</a:t>
+              <a:t>16/05/2018</a:t>
             </a:fld>
             <a:endParaRPr lang="es-MX"/>
           </a:p>
@@ -4993,7 +4995,7 @@
           <a:p>
             <a:fld id="{62679F1D-5062-4A60-BCF1-CCD0E44F4E32}" type="datetimeFigureOut">
               <a:rPr lang="es-MX" smtClean="0"/>
-              <a:t>09/05/2018</a:t>
+              <a:t>16/05/2018</a:t>
             </a:fld>
             <a:endParaRPr lang="es-MX"/>
           </a:p>
@@ -11278,10 +11280,10 @@
             </a:r>
             <a:r>
               <a:rPr lang="es-MX" dirty="0"/>
-              <a:t> y la separación entre palabras se controla mediante </a:t>
-            </a:r>
-            <a:r>
-              <a:rPr lang="es-MX" dirty="0" err="1"/>
+              <a:t> y </a:t>
+            </a:r>
+            <a:r>
+              <a:rPr lang="es-MX" dirty="0" err="1" smtClean="0"/>
               <a:t>word-spacing</a:t>
             </a:r>
             <a:r>
@@ -11298,7 +11300,7 @@
             <a:spLocks noGrp="1"/>
           </p:cNvSpPr>
           <p:nvPr>
-            <p:ph idx="1"/>
+            <p:ph sz="half" idx="1"/>
           </p:nvPr>
         </p:nvSpPr>
         <p:spPr/>
@@ -11311,20 +11313,25 @@
               <a:t>	valores  normal | unidad de medida | </a:t>
             </a:r>
             <a:r>
-              <a:rPr lang="es-MX" dirty="0" err="1"/>
+              <a:rPr lang="es-MX" dirty="0" err="1" smtClean="0"/>
               <a:t>inherit</a:t>
             </a:r>
+            <a:endParaRPr lang="es-MX" dirty="0" smtClean="0"/>
+          </a:p>
+          <a:p>
             <a:endParaRPr lang="es-MX" dirty="0"/>
           </a:p>
         </p:txBody>
       </p:sp>
       <p:pic>
         <p:nvPicPr>
-          <p:cNvPr id="4" name="Imagen 3"/>
+          <p:cNvPr id="7" name="Marcador de contenido 6"/>
           <p:cNvPicPr>
-            <a:picLocks noChangeAspect="1"/>
+            <a:picLocks noGrp="1" noChangeAspect="1"/>
           </p:cNvPicPr>
-          <p:nvPr/>
+          <p:nvPr>
+            <p:ph sz="half" idx="2"/>
+          </p:nvPr>
         </p:nvPicPr>
         <p:blipFill>
           <a:blip r:embed="rId2"/>
@@ -11334,8 +11341,8 @@
         </p:blipFill>
         <p:spPr>
           <a:xfrm>
-            <a:off x="3034152" y="2566914"/>
-            <a:ext cx="6067425" cy="4171950"/>
+            <a:off x="6188075" y="2255980"/>
+            <a:ext cx="5194300" cy="3571590"/>
           </a:xfrm>
           <a:prstGeom prst="rect">
             <a:avLst/>
@@ -11346,6 +11353,338 @@
     <p:extLst>
       <p:ext uri="{BB962C8B-B14F-4D97-AF65-F5344CB8AC3E}">
         <p14:creationId xmlns:p14="http://schemas.microsoft.com/office/powerpoint/2010/main" val="3840287362"/>
+      </p:ext>
+    </p:extLst>
+  </p:cSld>
+  <p:clrMapOvr>
+    <a:masterClrMapping/>
+  </p:clrMapOvr>
+</p:sld>
+</file>
+
+<file path=ppt/slides/slide55.xml><?xml version="1.0" encoding="utf-8"?>
+<p:sld xmlns:a="http://schemas.openxmlformats.org/drawingml/2006/main" xmlns:r="http://schemas.openxmlformats.org/officeDocument/2006/relationships" xmlns:p="http://schemas.openxmlformats.org/presentationml/2006/main">
+  <p:cSld>
+    <p:spTree>
+      <p:nvGrpSpPr>
+        <p:cNvPr id="1" name=""/>
+        <p:cNvGrpSpPr/>
+        <p:nvPr/>
+      </p:nvGrpSpPr>
+      <p:grpSpPr>
+        <a:xfrm>
+          <a:off x="0" y="0"/>
+          <a:ext cx="0" cy="0"/>
+          <a:chOff x="0" y="0"/>
+          <a:chExt cx="0" cy="0"/>
+        </a:xfrm>
+      </p:grpSpPr>
+      <p:sp>
+        <p:nvSpPr>
+          <p:cNvPr id="5" name="Título 4"/>
+          <p:cNvSpPr>
+            <a:spLocks noGrp="1"/>
+          </p:cNvSpPr>
+          <p:nvPr>
+            <p:ph type="title"/>
+          </p:nvPr>
+        </p:nvSpPr>
+        <p:spPr/>
+        <p:txBody>
+          <a:bodyPr/>
+          <a:lstStyle/>
+          <a:p>
+            <a:r>
+              <a:rPr lang="es-MX" dirty="0" smtClean="0"/>
+              <a:t>Ejercicio CSS3</a:t>
+            </a:r>
+            <a:endParaRPr lang="es-MX" dirty="0"/>
+          </a:p>
+        </p:txBody>
+      </p:sp>
+      <p:pic>
+        <p:nvPicPr>
+          <p:cNvPr id="1026" name="Picture 2" descr="http://www.tutorialhtml.net/manualCSS/practicas/practica2.gif"/>
+          <p:cNvPicPr>
+            <a:picLocks noGrp="1" noChangeAspect="1" noChangeArrowheads="1"/>
+          </p:cNvPicPr>
+          <p:nvPr>
+            <p:ph sz="half" idx="1"/>
+          </p:nvPr>
+        </p:nvPicPr>
+        <p:blipFill>
+          <a:blip r:embed="rId2">
+            <a:extLst>
+              <a:ext uri="{28A0092B-C50C-407E-A947-70E740481C1C}">
+                <a14:useLocalDpi xmlns:a14="http://schemas.microsoft.com/office/drawing/2010/main" val="0"/>
+              </a:ext>
+            </a:extLst>
+          </a:blip>
+          <a:stretch>
+            <a:fillRect/>
+          </a:stretch>
+        </p:blipFill>
+        <p:spPr bwMode="auto">
+          <a:xfrm>
+            <a:off x="1042240" y="1597747"/>
+            <a:ext cx="5482244" cy="4443412"/>
+          </a:xfrm>
+          <a:prstGeom prst="rect">
+            <a:avLst/>
+          </a:prstGeom>
+          <a:noFill/>
+          <a:extLst>
+            <a:ext uri="{909E8E84-426E-40DD-AFC4-6F175D3DCCD1}">
+              <a14:hiddenFill xmlns:a14="http://schemas.microsoft.com/office/drawing/2010/main">
+                <a:solidFill>
+                  <a:srgbClr val="FFFFFF"/>
+                </a:solidFill>
+              </a14:hiddenFill>
+            </a:ext>
+          </a:extLst>
+        </p:spPr>
+      </p:pic>
+      <p:sp>
+        <p:nvSpPr>
+          <p:cNvPr id="9" name="Marcador de contenido 8"/>
+          <p:cNvSpPr>
+            <a:spLocks noGrp="1"/>
+          </p:cNvSpPr>
+          <p:nvPr>
+            <p:ph sz="half" idx="2"/>
+          </p:nvPr>
+        </p:nvSpPr>
+        <p:spPr>
+          <a:xfrm>
+            <a:off x="7439891" y="2222287"/>
+            <a:ext cx="3942107" cy="3638764"/>
+          </a:xfrm>
+        </p:spPr>
+        <p:txBody>
+          <a:bodyPr>
+            <a:normAutofit lnSpcReduction="10000"/>
+          </a:bodyPr>
+          <a:lstStyle/>
+          <a:p>
+            <a:r>
+              <a:rPr lang="es-MX" b="1" i="1" dirty="0" smtClean="0"/>
+              <a:t>Diseñar una pagina aplicando las reglas </a:t>
+            </a:r>
+            <a:r>
+              <a:rPr lang="es-MX" b="1" i="1" dirty="0" err="1" smtClean="0"/>
+              <a:t>css</a:t>
+            </a:r>
+            <a:r>
+              <a:rPr lang="es-MX" b="1" i="1" dirty="0" smtClean="0"/>
+              <a:t> necesarias </a:t>
+            </a:r>
+            <a:r>
+              <a:rPr lang="es-MX" b="1" i="1" dirty="0"/>
+              <a:t>para que la página resultante tenga el mismo aspecto que el de la </a:t>
+            </a:r>
+            <a:r>
+              <a:rPr lang="es-MX" b="1" i="1" dirty="0" smtClean="0"/>
+              <a:t>imagen.</a:t>
+            </a:r>
+          </a:p>
+          <a:p>
+            <a:endParaRPr lang="es-MX" b="1" i="1" dirty="0"/>
+          </a:p>
+          <a:p>
+            <a:r>
+              <a:rPr lang="es-MX" b="1" i="1" dirty="0" smtClean="0"/>
+              <a:t>Crear una carpeta en su carpeta DAW que se llame </a:t>
+            </a:r>
+            <a:r>
+              <a:rPr lang="es-MX" b="1" i="1" dirty="0" err="1" smtClean="0"/>
+              <a:t>css_ejemplo</a:t>
+            </a:r>
+            <a:r>
+              <a:rPr lang="es-MX" b="1" i="1" dirty="0"/>
+              <a:t> </a:t>
+            </a:r>
+            <a:r>
+              <a:rPr lang="es-MX" b="1" i="1" dirty="0" smtClean="0"/>
+              <a:t>y subir los archivos que utilizo para esta actividad.</a:t>
+            </a:r>
+          </a:p>
+          <a:p>
+            <a:r>
+              <a:rPr lang="es-MX" b="1" i="1" dirty="0" smtClean="0"/>
+              <a:t>Tiempo máximo: 21 </a:t>
+            </a:r>
+            <a:r>
+              <a:rPr lang="es-MX" b="1" i="1" smtClean="0"/>
+              <a:t>de mayo.</a:t>
+            </a:r>
+            <a:endParaRPr lang="es-MX" dirty="0"/>
+          </a:p>
+        </p:txBody>
+      </p:sp>
+    </p:spTree>
+    <p:extLst>
+      <p:ext uri="{BB962C8B-B14F-4D97-AF65-F5344CB8AC3E}">
+        <p14:creationId xmlns:p14="http://schemas.microsoft.com/office/powerpoint/2010/main" val="3839329440"/>
+      </p:ext>
+    </p:extLst>
+  </p:cSld>
+  <p:clrMapOvr>
+    <a:masterClrMapping/>
+  </p:clrMapOvr>
+</p:sld>
+</file>
+
+<file path=ppt/slides/slide56.xml><?xml version="1.0" encoding="utf-8"?>
+<p:sld xmlns:a="http://schemas.openxmlformats.org/drawingml/2006/main" xmlns:r="http://schemas.openxmlformats.org/officeDocument/2006/relationships" xmlns:p="http://schemas.openxmlformats.org/presentationml/2006/main">
+  <p:cSld>
+    <p:spTree>
+      <p:nvGrpSpPr>
+        <p:cNvPr id="1" name=""/>
+        <p:cNvGrpSpPr/>
+        <p:nvPr/>
+      </p:nvGrpSpPr>
+      <p:grpSpPr>
+        <a:xfrm>
+          <a:off x="0" y="0"/>
+          <a:ext cx="0" cy="0"/>
+          <a:chOff x="0" y="0"/>
+          <a:chExt cx="0" cy="0"/>
+        </a:xfrm>
+      </p:grpSpPr>
+      <p:sp>
+        <p:nvSpPr>
+          <p:cNvPr id="5" name="Título 4"/>
+          <p:cNvSpPr>
+            <a:spLocks noGrp="1"/>
+          </p:cNvSpPr>
+          <p:nvPr>
+            <p:ph type="title"/>
+          </p:nvPr>
+        </p:nvSpPr>
+        <p:spPr/>
+        <p:txBody>
+          <a:bodyPr/>
+          <a:lstStyle/>
+          <a:p>
+            <a:r>
+              <a:rPr lang="es-MX" dirty="0" smtClean="0"/>
+              <a:t>Ejercicio CSS3</a:t>
+            </a:r>
+            <a:endParaRPr lang="es-MX" dirty="0"/>
+          </a:p>
+        </p:txBody>
+      </p:sp>
+      <p:sp>
+        <p:nvSpPr>
+          <p:cNvPr id="9" name="Marcador de contenido 8"/>
+          <p:cNvSpPr>
+            <a:spLocks noGrp="1"/>
+          </p:cNvSpPr>
+          <p:nvPr>
+            <p:ph sz="half" idx="2"/>
+          </p:nvPr>
+        </p:nvSpPr>
+        <p:spPr>
+          <a:xfrm>
+            <a:off x="7439891" y="2222287"/>
+            <a:ext cx="3942107" cy="3638764"/>
+          </a:xfrm>
+        </p:spPr>
+        <p:txBody>
+          <a:bodyPr/>
+          <a:lstStyle/>
+          <a:p>
+            <a:r>
+              <a:rPr lang="es-MX" b="1" i="1" dirty="0" smtClean="0"/>
+              <a:t>Diseñar una pagina aplicando las reglas </a:t>
+            </a:r>
+            <a:r>
+              <a:rPr lang="es-MX" b="1" i="1" dirty="0" err="1" smtClean="0"/>
+              <a:t>css</a:t>
+            </a:r>
+            <a:r>
+              <a:rPr lang="es-MX" b="1" i="1" dirty="0" smtClean="0"/>
+              <a:t> necesarias </a:t>
+            </a:r>
+            <a:r>
+              <a:rPr lang="es-MX" b="1" i="1" dirty="0"/>
+              <a:t>para que la página resultante tenga el mismo aspecto que el de la </a:t>
+            </a:r>
+            <a:r>
+              <a:rPr lang="es-MX" b="1" i="1" dirty="0" smtClean="0"/>
+              <a:t>imagen.</a:t>
+            </a:r>
+          </a:p>
+          <a:p>
+            <a:r>
+              <a:rPr lang="es-MX" b="1" i="1" dirty="0" smtClean="0"/>
+              <a:t>Crear en su carpeta DAW un directorio que se llame </a:t>
+            </a:r>
+            <a:r>
+              <a:rPr lang="es-MX" b="1" i="1" dirty="0" err="1" smtClean="0"/>
+              <a:t>templatey</a:t>
+            </a:r>
+            <a:r>
+              <a:rPr lang="es-MX" b="1" i="1" dirty="0" smtClean="0"/>
+              <a:t> subir los archivos para hacer esta actividad.</a:t>
+            </a:r>
+          </a:p>
+          <a:p>
+            <a:r>
+              <a:rPr lang="es-MX" b="1" i="1" dirty="0" smtClean="0"/>
+              <a:t>Tiempo limite 21 de mayo.</a:t>
+            </a:r>
+            <a:endParaRPr lang="es-MX" dirty="0"/>
+          </a:p>
+        </p:txBody>
+      </p:sp>
+      <p:pic>
+        <p:nvPicPr>
+          <p:cNvPr id="2052" name="Picture 4" descr="http://www.tutorialhtml.net/manualCSS/practicas/practica3-solucion.gif"/>
+          <p:cNvPicPr>
+            <a:picLocks noGrp="1" noChangeAspect="1" noChangeArrowheads="1"/>
+          </p:cNvPicPr>
+          <p:nvPr>
+            <p:ph sz="half" idx="1"/>
+          </p:nvPr>
+        </p:nvPicPr>
+        <p:blipFill>
+          <a:blip r:embed="rId2">
+            <a:extLst>
+              <a:ext uri="{28A0092B-C50C-407E-A947-70E740481C1C}">
+                <a14:useLocalDpi xmlns:a14="http://schemas.microsoft.com/office/drawing/2010/main" val="0"/>
+              </a:ext>
+            </a:extLst>
+          </a:blip>
+          <a:srcRect/>
+          <a:stretch>
+            <a:fillRect/>
+          </a:stretch>
+        </p:blipFill>
+        <p:spPr bwMode="auto">
+          <a:xfrm>
+            <a:off x="810000" y="1396670"/>
+            <a:ext cx="6103418" cy="5106527"/>
+          </a:xfrm>
+          <a:prstGeom prst="rect">
+            <a:avLst/>
+          </a:prstGeom>
+          <a:noFill/>
+          <a:extLst>
+            <a:ext uri="{909E8E84-426E-40DD-AFC4-6F175D3DCCD1}">
+              <a14:hiddenFill xmlns:a14="http://schemas.microsoft.com/office/drawing/2010/main">
+                <a:solidFill>
+                  <a:srgbClr val="FFFFFF"/>
+                </a:solidFill>
+              </a14:hiddenFill>
+            </a:ext>
+          </a:extLst>
+        </p:spPr>
+      </p:pic>
+    </p:spTree>
+    <p:extLst>
+      <p:ext uri="{BB962C8B-B14F-4D97-AF65-F5344CB8AC3E}">
+        <p14:creationId xmlns:p14="http://schemas.microsoft.com/office/powerpoint/2010/main" val="1214003966"/>
       </p:ext>
     </p:extLst>
   </p:cSld>

</xml_diff>